<commit_message>
Update lecture 16 slides
</commit_message>
<xml_diff>
--- a/lectures/16-Review-Ex.pptx
+++ b/lectures/16-Review-Ex.pptx
@@ -9,8 +9,9 @@
     <p:sldId id="256" r:id="rId3"/>
     <p:sldId id="263" r:id="rId4"/>
     <p:sldId id="262" r:id="rId5"/>
-    <p:sldId id="264" r:id="rId6"/>
-    <p:sldId id="260" r:id="rId7"/>
+    <p:sldId id="265" r:id="rId6"/>
+    <p:sldId id="264" r:id="rId7"/>
+    <p:sldId id="260" r:id="rId8"/>
   </p:sldIdLst>
   <p:sldSz cx="12192000" cy="6858000"/>
   <p:notesSz cx="6858000" cy="9144000"/>
@@ -120,7 +121,7 @@
 <file path=ppt/revisionInfo.xml><?xml version="1.0" encoding="utf-8"?>
 <p1510:revInfo xmlns:a="http://schemas.openxmlformats.org/drawingml/2006/main" xmlns:r="http://schemas.openxmlformats.org/officeDocument/2006/relationships" xmlns:p1510="http://schemas.microsoft.com/office/powerpoint/2015/10/main">
   <p1510:revLst>
-    <p1510:client id="{261CE662-30AC-48FD-8917-37AD3537F14A}" v="391" dt="2022-10-19T19:17:32.725"/>
+    <p1510:client id="{261CE662-30AC-48FD-8917-37AD3537F14A}" v="438" dt="2022-10-19T19:23:22.097"/>
     <p1510:client id="{2AD7E4B5-B756-445A-BCC1-1967733588EF}" v="210" dt="2022-10-02T02:08:51.856"/>
     <p1510:client id="{350877F5-55B3-45A8-83BC-CEDF9291A6BE}" v="84" dt="2022-10-18T20:17:18.013"/>
     <p1510:client id="{A9848391-E84D-45D3-B5C6-E80FAC44AA6F}" v="3" dt="2022-10-16T19:51:44.381"/>
@@ -4308,7 +4309,7 @@
         <p:spPr>
           <a:xfrm>
             <a:off x="838200" y="1825625"/>
-            <a:ext cx="10708640" cy="5032058"/>
+            <a:ext cx="10820400" cy="5032058"/>
           </a:xfrm>
         </p:spPr>
         <p:txBody>
@@ -4321,44 +4322,58 @@
               <a:rPr lang="en-US" dirty="0">
                 <a:cs typeface="Calibri"/>
               </a:rPr>
-              <a:t>Clone exercise repo, create individual branch.</a:t>
-            </a:r>
-          </a:p>
-          <a:p>
-            <a:r>
-              <a:rPr lang="en-US" dirty="0">
-                <a:cs typeface="Calibri"/>
-              </a:rPr>
-              <a:t>Unzip code with three implementations of chess in C++ (about 1200 total lines each) and commit/push </a:t>
-            </a:r>
-            <a:r>
-              <a:rPr lang="en-US" b="1" dirty="0">
-                <a:cs typeface="Calibri"/>
-              </a:rPr>
-              <a:t>on your branch. Committing or pushing to main will result in a penalty.</a:t>
-            </a:r>
-          </a:p>
-          <a:p>
-            <a:r>
-              <a:rPr lang="en-US" dirty="0">
-                <a:cs typeface="Calibri"/>
-              </a:rPr>
-              <a:t>Issue pull request to main with the unzipped code and start a review.</a:t>
-            </a:r>
-          </a:p>
-          <a:p>
-            <a:r>
-              <a:rPr lang="en-US" dirty="0">
-                <a:ea typeface="+mn-lt"/>
-                <a:cs typeface="+mn-lt"/>
-              </a:rPr>
-              <a:t>Read </a:t>
+              <a:t>Clone </a:t>
             </a:r>
             <a:r>
               <a:rPr lang="en-US" dirty="0">
                 <a:ea typeface="+mn-lt"/>
                 <a:cs typeface="+mn-lt"/>
                 <a:hlinkClick r:id="rId2"/>
+              </a:rPr>
+              <a:t>github.com/kilgallin/SWEF22-Exercise-5</a:t>
+            </a:r>
+            <a:r>
+              <a:rPr lang="en-US" dirty="0">
+                <a:cs typeface="Calibri"/>
+              </a:rPr>
+              <a:t>; create individual branch.</a:t>
+            </a:r>
+          </a:p>
+          <a:p>
+            <a:r>
+              <a:rPr lang="en-US" dirty="0">
+                <a:cs typeface="Calibri"/>
+              </a:rPr>
+              <a:t>Unzip code with three implementations of chess in C++ (about 1200 total lines each) and commit/push </a:t>
+            </a:r>
+            <a:r>
+              <a:rPr lang="en-US" b="1" dirty="0">
+                <a:cs typeface="Calibri"/>
+              </a:rPr>
+              <a:t>on your branch. Committing or pushing to main will result in a penalty.</a:t>
+            </a:r>
+          </a:p>
+          <a:p>
+            <a:r>
+              <a:rPr lang="en-US" dirty="0">
+                <a:cs typeface="Calibri"/>
+              </a:rPr>
+              <a:t>Issue pull request to main with the unzipped code and start a review.</a:t>
+            </a:r>
+          </a:p>
+          <a:p>
+            <a:r>
+              <a:rPr lang="en-US" dirty="0">
+                <a:ea typeface="+mn-lt"/>
+                <a:cs typeface="+mn-lt"/>
+              </a:rPr>
+              <a:t>Read </a:t>
+            </a:r>
+            <a:r>
+              <a:rPr lang="en-US" dirty="0">
+                <a:ea typeface="+mn-lt"/>
+                <a:cs typeface="+mn-lt"/>
+                <a:hlinkClick r:id="rId3"/>
               </a:rPr>
               <a:t>Avoid Else, Return Early. Tim Oxley. 2013. "Probably Wrong" blog.</a:t>
             </a:r>
@@ -4428,6 +4443,209 @@
           <p:cNvPr id="2" name="Title 1">
             <a:extLst>
               <a:ext uri="{FF2B5EF4-FFF2-40B4-BE49-F238E27FC236}">
+                <a16:creationId xmlns:a16="http://schemas.microsoft.com/office/drawing/2014/main" id="{6886D99F-E2FD-5FFD-FF00-4D1EE02F7B51}"/>
+              </a:ext>
+            </a:extLst>
+          </p:cNvPr>
+          <p:cNvSpPr>
+            <a:spLocks noGrp="1"/>
+          </p:cNvSpPr>
+          <p:nvPr>
+            <p:ph type="title"/>
+          </p:nvPr>
+        </p:nvSpPr>
+        <p:spPr/>
+        <p:txBody>
+          <a:bodyPr/>
+          <a:lstStyle/>
+          <a:p>
+            <a:r>
+              <a:rPr lang="en-US" dirty="0">
+                <a:cs typeface="Calibri Light"/>
+              </a:rPr>
+              <a:t>Git Commands</a:t>
+            </a:r>
+            <a:endParaRPr lang="en-US" dirty="0"/>
+          </a:p>
+        </p:txBody>
+      </p:sp>
+      <p:sp>
+        <p:nvSpPr>
+          <p:cNvPr id="3" name="Content Placeholder 2">
+            <a:extLst>
+              <a:ext uri="{FF2B5EF4-FFF2-40B4-BE49-F238E27FC236}">
+                <a16:creationId xmlns:a16="http://schemas.microsoft.com/office/drawing/2014/main" id="{5D2859BF-24F4-0444-6234-8BB31BDDC813}"/>
+              </a:ext>
+            </a:extLst>
+          </p:cNvPr>
+          <p:cNvSpPr>
+            <a:spLocks noGrp="1"/>
+          </p:cNvSpPr>
+          <p:nvPr>
+            <p:ph idx="1"/>
+          </p:nvPr>
+        </p:nvSpPr>
+        <p:spPr/>
+        <p:txBody>
+          <a:bodyPr vert="horz" lIns="91440" tIns="45720" rIns="91440" bIns="45720" rtlCol="0" anchor="t">
+            <a:normAutofit/>
+          </a:bodyPr>
+          <a:lstStyle/>
+          <a:p>
+            <a:pPr marL="514350" indent="-514350">
+              <a:buAutoNum type="arabicPeriod"/>
+            </a:pPr>
+            <a:r>
+              <a:rPr lang="en-US" dirty="0">
+                <a:ea typeface="+mn-lt"/>
+                <a:cs typeface="+mn-lt"/>
+              </a:rPr>
+              <a:t>git clone </a:t>
+            </a:r>
+            <a:r>
+              <a:rPr lang="en-US" u="sng" dirty="0">
+                <a:ea typeface="+mn-lt"/>
+                <a:cs typeface="+mn-lt"/>
+                <a:hlinkClick r:id="rId2"/>
+              </a:rPr>
+              <a:t>https://github.com/kilgallin/SWEF22-Exercise-5</a:t>
+            </a:r>
+            <a:endParaRPr lang="en-US" u="sng" dirty="0">
+              <a:ea typeface="+mn-lt"/>
+              <a:cs typeface="+mn-lt"/>
+            </a:endParaRPr>
+          </a:p>
+          <a:p>
+            <a:pPr marL="514350" indent="-514350">
+              <a:buAutoNum type="arabicPeriod"/>
+            </a:pPr>
+            <a:r>
+              <a:rPr lang="en-US" dirty="0">
+                <a:ea typeface="+mn-lt"/>
+                <a:cs typeface="+mn-lt"/>
+              </a:rPr>
+              <a:t>git checkout -b jdk72 </a:t>
+            </a:r>
+            <a:br>
+              <a:rPr lang="en-US" dirty="0">
+                <a:ea typeface="+mn-lt"/>
+                <a:cs typeface="+mn-lt"/>
+              </a:rPr>
+            </a:br>
+            <a:r>
+              <a:rPr lang="en-US" dirty="0">
+                <a:ea typeface="+mn-lt"/>
+                <a:cs typeface="+mn-lt"/>
+              </a:rPr>
+              <a:t>#checkout -b both creates a branch and checks it out</a:t>
+            </a:r>
+            <a:endParaRPr lang="en-US">
+              <a:ea typeface="+mn-lt"/>
+              <a:cs typeface="+mn-lt"/>
+            </a:endParaRPr>
+          </a:p>
+          <a:p>
+            <a:pPr marL="514350" indent="-514350">
+              <a:buAutoNum type="arabicPeriod"/>
+            </a:pPr>
+            <a:r>
+              <a:rPr lang="en-US" dirty="0">
+                <a:ea typeface="+mn-lt"/>
+                <a:cs typeface="+mn-lt"/>
+              </a:rPr>
+              <a:t>unzip chessRepos.zip</a:t>
+            </a:r>
+          </a:p>
+          <a:p>
+            <a:pPr marL="514350" indent="-514350">
+              <a:buAutoNum type="arabicPeriod"/>
+            </a:pPr>
+            <a:r>
+              <a:rPr lang="en-US" dirty="0">
+                <a:ea typeface="+mn-lt"/>
+                <a:cs typeface="+mn-lt"/>
+              </a:rPr>
+              <a:t>git add *</a:t>
+            </a:r>
+          </a:p>
+          <a:p>
+            <a:pPr marL="514350" indent="-514350">
+              <a:buAutoNum type="arabicPeriod"/>
+            </a:pPr>
+            <a:r>
+              <a:rPr lang="en-US" dirty="0">
+                <a:ea typeface="+mn-lt"/>
+                <a:cs typeface="+mn-lt"/>
+              </a:rPr>
+              <a:t>git commit -a -m “jdk72 codebase”</a:t>
+            </a:r>
+          </a:p>
+          <a:p>
+            <a:pPr marL="514350" indent="-514350">
+              <a:buAutoNum type="arabicPeriod"/>
+            </a:pPr>
+            <a:r>
+              <a:rPr lang="en-US" dirty="0">
+                <a:ea typeface="+mn-lt"/>
+                <a:cs typeface="+mn-lt"/>
+              </a:rPr>
+              <a:t>git push --set-upstream origin jdk72 </a:t>
+            </a:r>
+            <a:br>
+              <a:rPr lang="en-US" dirty="0">
+                <a:ea typeface="+mn-lt"/>
+                <a:cs typeface="+mn-lt"/>
+              </a:rPr>
+            </a:br>
+            <a:r>
+              <a:rPr lang="en-US" dirty="0">
+                <a:ea typeface="+mn-lt"/>
+                <a:cs typeface="+mn-lt"/>
+              </a:rPr>
+              <a:t>#Need to specifically push your branch</a:t>
+            </a:r>
+            <a:endParaRPr lang="en-US">
+              <a:ea typeface="+mn-lt"/>
+              <a:cs typeface="+mn-lt"/>
+            </a:endParaRPr>
+          </a:p>
+        </p:txBody>
+      </p:sp>
+    </p:spTree>
+    <p:extLst>
+      <p:ext uri="{BB962C8B-B14F-4D97-AF65-F5344CB8AC3E}">
+        <p14:creationId xmlns:p14="http://schemas.microsoft.com/office/powerpoint/2010/main" val="1368713940"/>
+      </p:ext>
+    </p:extLst>
+  </p:cSld>
+  <p:clrMapOvr>
+    <a:masterClrMapping/>
+  </p:clrMapOvr>
+</p:sld>
+</file>
+
+<file path=ppt/slides/slide6.xml><?xml version="1.0" encoding="utf-8"?>
+<p:sld xmlns:a="http://schemas.openxmlformats.org/drawingml/2006/main" xmlns:r="http://schemas.openxmlformats.org/officeDocument/2006/relationships" xmlns:p="http://schemas.openxmlformats.org/presentationml/2006/main">
+  <p:cSld>
+    <p:spTree>
+      <p:nvGrpSpPr>
+        <p:cNvPr id="1" name=""/>
+        <p:cNvGrpSpPr/>
+        <p:nvPr/>
+      </p:nvGrpSpPr>
+      <p:grpSpPr>
+        <a:xfrm>
+          <a:off x="0" y="0"/>
+          <a:ext cx="0" cy="0"/>
+          <a:chOff x="0" y="0"/>
+          <a:chExt cx="0" cy="0"/>
+        </a:xfrm>
+      </p:grpSpPr>
+      <p:sp>
+        <p:nvSpPr>
+          <p:cNvPr id="2" name="Title 1">
+            <a:extLst>
+              <a:ext uri="{FF2B5EF4-FFF2-40B4-BE49-F238E27FC236}">
                 <a16:creationId xmlns:a16="http://schemas.microsoft.com/office/drawing/2014/main" id="{9FE64BC3-2FB5-54E2-A1A4-FFE065ACDA4B}"/>
               </a:ext>
             </a:extLst>
@@ -4582,7 +4800,7 @@
 </p:sld>
 </file>
 
-<file path=ppt/slides/slide6.xml><?xml version="1.0" encoding="utf-8"?>
+<file path=ppt/slides/slide7.xml><?xml version="1.0" encoding="utf-8"?>
 <p:sld xmlns:a="http://schemas.openxmlformats.org/drawingml/2006/main" xmlns:r="http://schemas.openxmlformats.org/officeDocument/2006/relationships" xmlns:p="http://schemas.openxmlformats.org/presentationml/2006/main">
   <p:cSld>
     <p:spTree>

</xml_diff>